<commit_message>
parte de la presentacion de javier (martes)
</commit_message>
<xml_diff>
--- a/presentaciones_pasadas/presentacion1/GranaSat Batteries Tester.pptx
+++ b/presentaciones_pasadas/presentacion1/GranaSat Batteries Tester.pptx
@@ -115,6 +115,22 @@
       </a:defRPr>
     </a:lvl9pPr>
   </p:defaultTextStyle>
+  <p:extLst>
+    <p:ext uri="{EFAFB233-063F-42B5-8137-9DF3F51BA10A}">
+      <p15:sldGuideLst xmlns:p15="http://schemas.microsoft.com/office/powerpoint/2012/main">
+        <p15:guide id="1" orient="horz" pos="2160">
+          <p15:clr>
+            <a:srgbClr val="A4A3A4"/>
+          </p15:clr>
+        </p15:guide>
+        <p15:guide id="2" pos="3840">
+          <p15:clr>
+            <a:srgbClr val="A4A3A4"/>
+          </p15:clr>
+        </p15:guide>
+      </p15:sldGuideLst>
+    </p:ext>
+  </p:extLst>
 </p:presentation>
 </file>
 
@@ -200,7 +216,7 @@
           <a:p>
             <a:fld id="{C0B54FE1-217A-420E-ACAB-3712F4894455}" type="datetimeFigureOut">
               <a:rPr lang="es-ES" smtClean="0"/>
-              <a:t>06/07/2018</a:t>
+              <a:t>10/07/2018</a:t>
             </a:fld>
             <a:endParaRPr lang="es-ES"/>
           </a:p>
@@ -527,6 +543,11 @@
         </p:txBody>
       </p:sp>
     </p:spTree>
+    <p:extLst>
+      <p:ext uri="{BB962C8B-B14F-4D97-AF65-F5344CB8AC3E}">
+        <p14:creationId xmlns:p14="http://schemas.microsoft.com/office/powerpoint/2010/main" val="1909759288"/>
+      </p:ext>
+    </p:extLst>
   </p:cSld>
   <p:clrMapOvr>
     <a:masterClrMapping/>
@@ -593,6 +614,11 @@
         </p:txBody>
       </p:sp>
     </p:spTree>
+    <p:extLst>
+      <p:ext uri="{BB962C8B-B14F-4D97-AF65-F5344CB8AC3E}">
+        <p14:creationId xmlns:p14="http://schemas.microsoft.com/office/powerpoint/2010/main" val="2229660949"/>
+      </p:ext>
+    </p:extLst>
   </p:cSld>
   <p:clrMapOvr>
     <a:masterClrMapping/>
@@ -659,6 +685,11 @@
         </p:txBody>
       </p:sp>
     </p:spTree>
+    <p:extLst>
+      <p:ext uri="{BB962C8B-B14F-4D97-AF65-F5344CB8AC3E}">
+        <p14:creationId xmlns:p14="http://schemas.microsoft.com/office/powerpoint/2010/main" val="1820388249"/>
+      </p:ext>
+    </p:extLst>
   </p:cSld>
   <p:clrMapOvr>
     <a:masterClrMapping/>
@@ -725,6 +756,11 @@
         </p:txBody>
       </p:sp>
     </p:spTree>
+    <p:extLst>
+      <p:ext uri="{BB962C8B-B14F-4D97-AF65-F5344CB8AC3E}">
+        <p14:creationId xmlns:p14="http://schemas.microsoft.com/office/powerpoint/2010/main" val="902808847"/>
+      </p:ext>
+    </p:extLst>
   </p:cSld>
   <p:clrMapOvr>
     <a:masterClrMapping/>
@@ -863,7 +899,7 @@
           <a:p>
             <a:fld id="{1F410A39-4CA3-4BBD-BCF7-05105977209B}" type="datetime1">
               <a:rPr lang="es-ES" smtClean="0"/>
-              <a:t>06/07/2018</a:t>
+              <a:t>10/07/2018</a:t>
             </a:fld>
             <a:endParaRPr lang="es-ES"/>
           </a:p>
@@ -1033,7 +1069,7 @@
           <a:p>
             <a:fld id="{8FA5C0D5-57A1-4D7E-AB8D-C1DBE6C3BABB}" type="datetime1">
               <a:rPr lang="es-ES" smtClean="0"/>
-              <a:t>06/07/2018</a:t>
+              <a:t>10/07/2018</a:t>
             </a:fld>
             <a:endParaRPr lang="es-ES"/>
           </a:p>
@@ -1213,7 +1249,7 @@
           <a:p>
             <a:fld id="{9932EE06-F8A7-4136-AE34-65A90D62E597}" type="datetime1">
               <a:rPr lang="es-ES" smtClean="0"/>
-              <a:t>06/07/2018</a:t>
+              <a:t>10/07/2018</a:t>
             </a:fld>
             <a:endParaRPr lang="es-ES"/>
           </a:p>
@@ -1383,7 +1419,7 @@
           <a:p>
             <a:fld id="{AD581351-A9E7-4D1B-89CC-35458A727165}" type="datetime1">
               <a:rPr lang="es-ES" smtClean="0"/>
-              <a:t>06/07/2018</a:t>
+              <a:t>10/07/2018</a:t>
             </a:fld>
             <a:endParaRPr lang="es-ES"/>
           </a:p>
@@ -1629,7 +1665,7 @@
           <a:p>
             <a:fld id="{CC8EF509-697E-437F-A2EB-D49D78A8BC3F}" type="datetime1">
               <a:rPr lang="es-ES" smtClean="0"/>
-              <a:t>06/07/2018</a:t>
+              <a:t>10/07/2018</a:t>
             </a:fld>
             <a:endParaRPr lang="es-ES"/>
           </a:p>
@@ -1861,7 +1897,7 @@
           <a:p>
             <a:fld id="{FE84F148-4FE6-4286-89B8-8771ADF8B871}" type="datetime1">
               <a:rPr lang="es-ES" smtClean="0"/>
-              <a:t>06/07/2018</a:t>
+              <a:t>10/07/2018</a:t>
             </a:fld>
             <a:endParaRPr lang="es-ES"/>
           </a:p>
@@ -2228,7 +2264,7 @@
           <a:p>
             <a:fld id="{D82C107A-2570-42F8-A084-CD0F5197B116}" type="datetime1">
               <a:rPr lang="es-ES" smtClean="0"/>
-              <a:t>06/07/2018</a:t>
+              <a:t>10/07/2018</a:t>
             </a:fld>
             <a:endParaRPr lang="es-ES"/>
           </a:p>
@@ -2346,7 +2382,7 @@
           <a:p>
             <a:fld id="{FA72C699-A605-43D9-9D8D-25F443B36A30}" type="datetime1">
               <a:rPr lang="es-ES" smtClean="0"/>
-              <a:t>06/07/2018</a:t>
+              <a:t>10/07/2018</a:t>
             </a:fld>
             <a:endParaRPr lang="es-ES"/>
           </a:p>
@@ -2441,7 +2477,7 @@
           <a:p>
             <a:fld id="{C0EAAAF4-388D-4523-8E6C-F71D25FDB18E}" type="datetime1">
               <a:rPr lang="es-ES" smtClean="0"/>
-              <a:t>06/07/2018</a:t>
+              <a:t>10/07/2018</a:t>
             </a:fld>
             <a:endParaRPr lang="es-ES"/>
           </a:p>
@@ -2718,7 +2754,7 @@
           <a:p>
             <a:fld id="{5C60DB7F-C546-4665-8158-6293D9BD71B2}" type="datetime1">
               <a:rPr lang="es-ES" smtClean="0"/>
-              <a:t>06/07/2018</a:t>
+              <a:t>10/07/2018</a:t>
             </a:fld>
             <a:endParaRPr lang="es-ES"/>
           </a:p>
@@ -2971,7 +3007,7 @@
           <a:p>
             <a:fld id="{8C26450D-BEDE-4609-847E-52DD98D9D1B6}" type="datetime1">
               <a:rPr lang="es-ES" smtClean="0"/>
-              <a:t>06/07/2018</a:t>
+              <a:t>10/07/2018</a:t>
             </a:fld>
             <a:endParaRPr lang="es-ES"/>
           </a:p>
@@ -3184,7 +3220,7 @@
           <a:p>
             <a:fld id="{B2AEC9D7-2590-49D1-902E-A16B1DAF3E2A}" type="datetime1">
               <a:rPr lang="es-ES" smtClean="0"/>
-              <a:t>06/07/2018</a:t>
+              <a:t>10/07/2018</a:t>
             </a:fld>
             <a:endParaRPr lang="es-ES"/>
           </a:p>
@@ -4247,11 +4283,7 @@
             </a:r>
             <a:r>
               <a:rPr lang="en-GB" sz="2000" dirty="0" smtClean="0"/>
-              <a:t>e </a:t>
-            </a:r>
-            <a:r>
-              <a:rPr lang="en-GB" sz="2000" dirty="0" smtClean="0"/>
-              <a:t>will made the </a:t>
+              <a:t>e will made the </a:t>
             </a:r>
             <a:r>
               <a:rPr lang="en-GB" sz="2000" dirty="0" err="1" smtClean="0"/>
@@ -8545,11 +8577,11 @@
   <p:clrMapOvr>
     <a:masterClrMapping/>
   </p:clrMapOvr>
-  <mc:AlternateContent xmlns:mc="http://schemas.openxmlformats.org/markup-compatibility/2006">
-    <mc:Choice xmlns:p14="http://schemas.microsoft.com/office/powerpoint/2010/main" Requires="p14">
+  <mc:AlternateContent xmlns:mc="http://schemas.openxmlformats.org/markup-compatibility/2006" xmlns:p14="http://schemas.microsoft.com/office/powerpoint/2010/main">
+    <mc:Choice Requires="p14">
       <p:transition spd="slow" p14:dur="2000"/>
     </mc:Choice>
-    <mc:Fallback>
+    <mc:Fallback xmlns="">
       <p:transition spd="slow"/>
     </mc:Fallback>
   </mc:AlternateContent>
@@ -9795,11 +9827,11 @@
   <p:clrMapOvr>
     <a:masterClrMapping/>
   </p:clrMapOvr>
-  <mc:AlternateContent xmlns:mc="http://schemas.openxmlformats.org/markup-compatibility/2006">
-    <mc:Choice xmlns:p14="http://schemas.microsoft.com/office/powerpoint/2010/main" Requires="p14">
+  <mc:AlternateContent xmlns:mc="http://schemas.openxmlformats.org/markup-compatibility/2006" xmlns:p14="http://schemas.microsoft.com/office/powerpoint/2010/main">
+    <mc:Choice Requires="p14">
       <p:transition spd="slow" p14:dur="2000"/>
     </mc:Choice>
-    <mc:Fallback>
+    <mc:Fallback xmlns="">
       <p:transition spd="slow"/>
     </mc:Fallback>
   </mc:AlternateContent>
@@ -10895,11 +10927,11 @@
   <p:clrMapOvr>
     <a:masterClrMapping/>
   </p:clrMapOvr>
-  <mc:AlternateContent xmlns:mc="http://schemas.openxmlformats.org/markup-compatibility/2006">
-    <mc:Choice xmlns:p14="http://schemas.microsoft.com/office/powerpoint/2010/main" Requires="p14">
+  <mc:AlternateContent xmlns:mc="http://schemas.openxmlformats.org/markup-compatibility/2006" xmlns:p14="http://schemas.microsoft.com/office/powerpoint/2010/main">
+    <mc:Choice Requires="p14">
       <p:transition spd="slow" p14:dur="2000"/>
     </mc:Choice>
-    <mc:Fallback>
+    <mc:Fallback xmlns="">
       <p:transition spd="slow"/>
     </mc:Fallback>
   </mc:AlternateContent>
@@ -11148,11 +11180,11 @@
   <p:clrMapOvr>
     <a:masterClrMapping/>
   </p:clrMapOvr>
-  <mc:AlternateContent xmlns:mc="http://schemas.openxmlformats.org/markup-compatibility/2006">
-    <mc:Choice xmlns:p14="http://schemas.microsoft.com/office/powerpoint/2010/main" Requires="p14">
+  <mc:AlternateContent xmlns:mc="http://schemas.openxmlformats.org/markup-compatibility/2006" xmlns:p14="http://schemas.microsoft.com/office/powerpoint/2010/main">
+    <mc:Choice Requires="p14">
       <p:transition spd="slow" p14:dur="2000"/>
     </mc:Choice>
-    <mc:Fallback>
+    <mc:Fallback xmlns="">
       <p:transition spd="slow"/>
     </mc:Fallback>
   </mc:AlternateContent>
@@ -11421,7 +11453,7 @@
   <a:extraClrSchemeLst/>
   <a:extLst>
     <a:ext uri="{05A4C25C-085E-4340-85A3-A5531E510DB2}">
-      <thm15:themeFamily xmlns="" xmlns:thm15="http://schemas.microsoft.com/office/thememl/2012/main" name="Office Theme" id="{62F939B6-93AF-4DB8-9C6B-D6C7DFDC589F}" vid="{4A3C46E8-61CC-4603-A589-7422A47A8E4A}"/>
+      <thm15:themeFamily xmlns:thm15="http://schemas.microsoft.com/office/thememl/2012/main" name="Office Theme" id="{62F939B6-93AF-4DB8-9C6B-D6C7DFDC589F}" vid="{4A3C46E8-61CC-4603-A589-7422A47A8E4A}"/>
     </a:ext>
   </a:extLst>
 </a:theme>
@@ -11682,7 +11714,7 @@
   <a:extraClrSchemeLst/>
   <a:extLst>
     <a:ext uri="{05A4C25C-085E-4340-85A3-A5531E510DB2}">
-      <thm15:themeFamily xmlns="" xmlns:thm15="http://schemas.microsoft.com/office/thememl/2012/main" name="Office Theme" id="{62F939B6-93AF-4DB8-9C6B-D6C7DFDC589F}" vid="{4A3C46E8-61CC-4603-A589-7422A47A8E4A}"/>
+      <thm15:themeFamily xmlns:thm15="http://schemas.microsoft.com/office/thememl/2012/main" name="Office Theme" id="{62F939B6-93AF-4DB8-9C6B-D6C7DFDC589F}" vid="{4A3C46E8-61CC-4603-A589-7422A47A8E4A}"/>
     </a:ext>
   </a:extLst>
 </a:theme>

</xml_diff>